<commit_message>
Started generating content for the IntroToCloudNativeComputing presentation
</commit_message>
<xml_diff>
--- a/week1/Week1.pptx
+++ b/week1/Week1.pptx
@@ -4,6 +4,9 @@
   <p:sldMasterIdLst>
     <p:sldMasterId id="2147483648" r:id="rId1"/>
   </p:sldMasterIdLst>
+  <p:notesMasterIdLst>
+    <p:notesMasterId r:id="rId8"/>
+  </p:notesMasterIdLst>
   <p:sldIdLst>
     <p:sldId id="256" r:id="rId2"/>
     <p:sldId id="257" r:id="rId3"/>
@@ -12,14 +15,14 @@
     <p:sldId id="260" r:id="rId6"/>
     <p:sldId id="261" r:id="rId7"/>
   </p:sldIdLst>
-  <p:sldSz cx="12192000" cy="6858000"/>
+  <p:sldSz cx="9144000" cy="5143500" type="screen16x9"/>
   <p:notesSz cx="6858000" cy="9144000"/>
   <p:defaultTextStyle>
     <a:defPPr>
       <a:defRPr lang="en-US"/>
     </a:defPPr>
-    <a:lvl1pPr marL="0" algn="l" defTabSz="914400" rtl="0" eaLnBrk="1" latinLnBrk="0" hangingPunct="1">
-      <a:defRPr sz="1800" kern="1200">
+    <a:lvl1pPr marL="0" algn="l" defTabSz="685800" rtl="0" eaLnBrk="1" latinLnBrk="0" hangingPunct="1">
+      <a:defRPr sz="1350" kern="1200">
         <a:solidFill>
           <a:schemeClr val="tx1"/>
         </a:solidFill>
@@ -28,8 +31,8 @@
         <a:cs typeface="+mn-cs"/>
       </a:defRPr>
     </a:lvl1pPr>
-    <a:lvl2pPr marL="457200" algn="l" defTabSz="914400" rtl="0" eaLnBrk="1" latinLnBrk="0" hangingPunct="1">
-      <a:defRPr sz="1800" kern="1200">
+    <a:lvl2pPr marL="342900" algn="l" defTabSz="685800" rtl="0" eaLnBrk="1" latinLnBrk="0" hangingPunct="1">
+      <a:defRPr sz="1350" kern="1200">
         <a:solidFill>
           <a:schemeClr val="tx1"/>
         </a:solidFill>
@@ -38,8 +41,8 @@
         <a:cs typeface="+mn-cs"/>
       </a:defRPr>
     </a:lvl2pPr>
-    <a:lvl3pPr marL="914400" algn="l" defTabSz="914400" rtl="0" eaLnBrk="1" latinLnBrk="0" hangingPunct="1">
-      <a:defRPr sz="1800" kern="1200">
+    <a:lvl3pPr marL="685800" algn="l" defTabSz="685800" rtl="0" eaLnBrk="1" latinLnBrk="0" hangingPunct="1">
+      <a:defRPr sz="1350" kern="1200">
         <a:solidFill>
           <a:schemeClr val="tx1"/>
         </a:solidFill>
@@ -48,8 +51,8 @@
         <a:cs typeface="+mn-cs"/>
       </a:defRPr>
     </a:lvl3pPr>
-    <a:lvl4pPr marL="1371600" algn="l" defTabSz="914400" rtl="0" eaLnBrk="1" latinLnBrk="0" hangingPunct="1">
-      <a:defRPr sz="1800" kern="1200">
+    <a:lvl4pPr marL="1028700" algn="l" defTabSz="685800" rtl="0" eaLnBrk="1" latinLnBrk="0" hangingPunct="1">
+      <a:defRPr sz="1350" kern="1200">
         <a:solidFill>
           <a:schemeClr val="tx1"/>
         </a:solidFill>
@@ -58,8 +61,8 @@
         <a:cs typeface="+mn-cs"/>
       </a:defRPr>
     </a:lvl4pPr>
-    <a:lvl5pPr marL="1828800" algn="l" defTabSz="914400" rtl="0" eaLnBrk="1" latinLnBrk="0" hangingPunct="1">
-      <a:defRPr sz="1800" kern="1200">
+    <a:lvl5pPr marL="1371600" algn="l" defTabSz="685800" rtl="0" eaLnBrk="1" latinLnBrk="0" hangingPunct="1">
+      <a:defRPr sz="1350" kern="1200">
         <a:solidFill>
           <a:schemeClr val="tx1"/>
         </a:solidFill>
@@ -68,8 +71,8 @@
         <a:cs typeface="+mn-cs"/>
       </a:defRPr>
     </a:lvl5pPr>
-    <a:lvl6pPr marL="2286000" algn="l" defTabSz="914400" rtl="0" eaLnBrk="1" latinLnBrk="0" hangingPunct="1">
-      <a:defRPr sz="1800" kern="1200">
+    <a:lvl6pPr marL="1714500" algn="l" defTabSz="685800" rtl="0" eaLnBrk="1" latinLnBrk="0" hangingPunct="1">
+      <a:defRPr sz="1350" kern="1200">
         <a:solidFill>
           <a:schemeClr val="tx1"/>
         </a:solidFill>
@@ -78,8 +81,8 @@
         <a:cs typeface="+mn-cs"/>
       </a:defRPr>
     </a:lvl6pPr>
-    <a:lvl7pPr marL="2743200" algn="l" defTabSz="914400" rtl="0" eaLnBrk="1" latinLnBrk="0" hangingPunct="1">
-      <a:defRPr sz="1800" kern="1200">
+    <a:lvl7pPr marL="2057400" algn="l" defTabSz="685800" rtl="0" eaLnBrk="1" latinLnBrk="0" hangingPunct="1">
+      <a:defRPr sz="1350" kern="1200">
         <a:solidFill>
           <a:schemeClr val="tx1"/>
         </a:solidFill>
@@ -88,8 +91,8 @@
         <a:cs typeface="+mn-cs"/>
       </a:defRPr>
     </a:lvl7pPr>
-    <a:lvl8pPr marL="3200400" algn="l" defTabSz="914400" rtl="0" eaLnBrk="1" latinLnBrk="0" hangingPunct="1">
-      <a:defRPr sz="1800" kern="1200">
+    <a:lvl8pPr marL="2400300" algn="l" defTabSz="685800" rtl="0" eaLnBrk="1" latinLnBrk="0" hangingPunct="1">
+      <a:defRPr sz="1350" kern="1200">
         <a:solidFill>
           <a:schemeClr val="tx1"/>
         </a:solidFill>
@@ -98,8 +101,8 @@
         <a:cs typeface="+mn-cs"/>
       </a:defRPr>
     </a:lvl8pPr>
-    <a:lvl9pPr marL="3657600" algn="l" defTabSz="914400" rtl="0" eaLnBrk="1" latinLnBrk="0" hangingPunct="1">
-      <a:defRPr sz="1800" kern="1200">
+    <a:lvl9pPr marL="2743200" algn="l" defTabSz="685800" rtl="0" eaLnBrk="1" latinLnBrk="0" hangingPunct="1">
+      <a:defRPr sz="1350" kern="1200">
         <a:solidFill>
           <a:schemeClr val="tx1"/>
         </a:solidFill>
@@ -115,6 +118,442 @@
     </p:ext>
   </p:extLst>
 </p:presentation>
+</file>
+
+<file path=ppt/notesMasters/notesMaster1.xml><?xml version="1.0" encoding="utf-8"?>
+<p:notesMaster xmlns:a="http://schemas.openxmlformats.org/drawingml/2006/main" xmlns:r="http://schemas.openxmlformats.org/officeDocument/2006/relationships" xmlns:p="http://schemas.openxmlformats.org/presentationml/2006/main">
+  <p:cSld>
+    <p:bg>
+      <p:bgRef idx="1001">
+        <a:schemeClr val="bg1"/>
+      </p:bgRef>
+    </p:bg>
+    <p:spTree>
+      <p:nvGrpSpPr>
+        <p:cNvPr id="1" name=""/>
+        <p:cNvGrpSpPr/>
+        <p:nvPr/>
+      </p:nvGrpSpPr>
+      <p:grpSpPr>
+        <a:xfrm>
+          <a:off x="0" y="0"/>
+          <a:ext cx="0" cy="0"/>
+          <a:chOff x="0" y="0"/>
+          <a:chExt cx="0" cy="0"/>
+        </a:xfrm>
+      </p:grpSpPr>
+      <p:sp>
+        <p:nvSpPr>
+          <p:cNvPr id="2" name="Header Placeholder 1"/>
+          <p:cNvSpPr>
+            <a:spLocks noGrp="1"/>
+          </p:cNvSpPr>
+          <p:nvPr>
+            <p:ph type="hdr" sz="quarter"/>
+          </p:nvPr>
+        </p:nvSpPr>
+        <p:spPr>
+          <a:xfrm>
+            <a:off x="0" y="0"/>
+            <a:ext cx="2971800" cy="458788"/>
+          </a:xfrm>
+          <a:prstGeom prst="rect">
+            <a:avLst/>
+          </a:prstGeom>
+        </p:spPr>
+        <p:txBody>
+          <a:bodyPr vert="horz" lIns="91440" tIns="45720" rIns="91440" bIns="45720" rtlCol="0"/>
+          <a:lstStyle>
+            <a:lvl1pPr algn="l">
+              <a:defRPr sz="1200"/>
+            </a:lvl1pPr>
+          </a:lstStyle>
+          <a:p>
+            <a:endParaRPr lang="en-US"/>
+          </a:p>
+        </p:txBody>
+      </p:sp>
+      <p:sp>
+        <p:nvSpPr>
+          <p:cNvPr id="3" name="Date Placeholder 2"/>
+          <p:cNvSpPr>
+            <a:spLocks noGrp="1"/>
+          </p:cNvSpPr>
+          <p:nvPr>
+            <p:ph type="dt" idx="1"/>
+          </p:nvPr>
+        </p:nvSpPr>
+        <p:spPr>
+          <a:xfrm>
+            <a:off x="3884613" y="0"/>
+            <a:ext cx="2971800" cy="458788"/>
+          </a:xfrm>
+          <a:prstGeom prst="rect">
+            <a:avLst/>
+          </a:prstGeom>
+        </p:spPr>
+        <p:txBody>
+          <a:bodyPr vert="horz" lIns="91440" tIns="45720" rIns="91440" bIns="45720" rtlCol="0"/>
+          <a:lstStyle>
+            <a:lvl1pPr algn="r">
+              <a:defRPr sz="1200"/>
+            </a:lvl1pPr>
+          </a:lstStyle>
+          <a:p>
+            <a:fld id="{A9BDC06D-1AC3-B743-96DD-C884FA71712F}" type="datetimeFigureOut">
+              <a:rPr lang="en-US" smtClean="0"/>
+              <a:t>6/6/18</a:t>
+            </a:fld>
+            <a:endParaRPr lang="en-US"/>
+          </a:p>
+        </p:txBody>
+      </p:sp>
+      <p:sp>
+        <p:nvSpPr>
+          <p:cNvPr id="4" name="Slide Image Placeholder 3"/>
+          <p:cNvSpPr>
+            <a:spLocks noGrp="1" noRot="1" noChangeAspect="1"/>
+          </p:cNvSpPr>
+          <p:nvPr>
+            <p:ph type="sldImg" idx="2"/>
+          </p:nvPr>
+        </p:nvSpPr>
+        <p:spPr>
+          <a:xfrm>
+            <a:off x="685800" y="1143000"/>
+            <a:ext cx="5486400" cy="3086100"/>
+          </a:xfrm>
+          <a:prstGeom prst="rect">
+            <a:avLst/>
+          </a:prstGeom>
+          <a:noFill/>
+          <a:ln w="12700">
+            <a:solidFill>
+              <a:prstClr val="black"/>
+            </a:solidFill>
+          </a:ln>
+        </p:spPr>
+        <p:txBody>
+          <a:bodyPr vert="horz" lIns="91440" tIns="45720" rIns="91440" bIns="45720" rtlCol="0" anchor="ctr"/>
+          <a:lstStyle/>
+          <a:p>
+            <a:endParaRPr lang="en-US"/>
+          </a:p>
+        </p:txBody>
+      </p:sp>
+      <p:sp>
+        <p:nvSpPr>
+          <p:cNvPr id="5" name="Notes Placeholder 4"/>
+          <p:cNvSpPr>
+            <a:spLocks noGrp="1"/>
+          </p:cNvSpPr>
+          <p:nvPr>
+            <p:ph type="body" sz="quarter" idx="3"/>
+          </p:nvPr>
+        </p:nvSpPr>
+        <p:spPr>
+          <a:xfrm>
+            <a:off x="685800" y="4400550"/>
+            <a:ext cx="5486400" cy="3600450"/>
+          </a:xfrm>
+          <a:prstGeom prst="rect">
+            <a:avLst/>
+          </a:prstGeom>
+        </p:spPr>
+        <p:txBody>
+          <a:bodyPr vert="horz" lIns="91440" tIns="45720" rIns="91440" bIns="45720" rtlCol="0"/>
+          <a:lstStyle/>
+          <a:p>
+            <a:pPr lvl="0"/>
+            <a:r>
+              <a:rPr lang="en-US"/>
+              <a:t>Edit Master text styles</a:t>
+            </a:r>
+          </a:p>
+          <a:p>
+            <a:pPr lvl="1"/>
+            <a:r>
+              <a:rPr lang="en-US"/>
+              <a:t>Second level</a:t>
+            </a:r>
+          </a:p>
+          <a:p>
+            <a:pPr lvl="2"/>
+            <a:r>
+              <a:rPr lang="en-US"/>
+              <a:t>Third level</a:t>
+            </a:r>
+          </a:p>
+          <a:p>
+            <a:pPr lvl="3"/>
+            <a:r>
+              <a:rPr lang="en-US"/>
+              <a:t>Fourth level</a:t>
+            </a:r>
+          </a:p>
+          <a:p>
+            <a:pPr lvl="4"/>
+            <a:r>
+              <a:rPr lang="en-US"/>
+              <a:t>Fifth level</a:t>
+            </a:r>
+          </a:p>
+        </p:txBody>
+      </p:sp>
+      <p:sp>
+        <p:nvSpPr>
+          <p:cNvPr id="6" name="Footer Placeholder 5"/>
+          <p:cNvSpPr>
+            <a:spLocks noGrp="1"/>
+          </p:cNvSpPr>
+          <p:nvPr>
+            <p:ph type="ftr" sz="quarter" idx="4"/>
+          </p:nvPr>
+        </p:nvSpPr>
+        <p:spPr>
+          <a:xfrm>
+            <a:off x="0" y="8685213"/>
+            <a:ext cx="2971800" cy="458787"/>
+          </a:xfrm>
+          <a:prstGeom prst="rect">
+            <a:avLst/>
+          </a:prstGeom>
+        </p:spPr>
+        <p:txBody>
+          <a:bodyPr vert="horz" lIns="91440" tIns="45720" rIns="91440" bIns="45720" rtlCol="0" anchor="b"/>
+          <a:lstStyle>
+            <a:lvl1pPr algn="l">
+              <a:defRPr sz="1200"/>
+            </a:lvl1pPr>
+          </a:lstStyle>
+          <a:p>
+            <a:endParaRPr lang="en-US"/>
+          </a:p>
+        </p:txBody>
+      </p:sp>
+      <p:sp>
+        <p:nvSpPr>
+          <p:cNvPr id="7" name="Slide Number Placeholder 6"/>
+          <p:cNvSpPr>
+            <a:spLocks noGrp="1"/>
+          </p:cNvSpPr>
+          <p:nvPr>
+            <p:ph type="sldNum" sz="quarter" idx="5"/>
+          </p:nvPr>
+        </p:nvSpPr>
+        <p:spPr>
+          <a:xfrm>
+            <a:off x="3884613" y="8685213"/>
+            <a:ext cx="2971800" cy="458787"/>
+          </a:xfrm>
+          <a:prstGeom prst="rect">
+            <a:avLst/>
+          </a:prstGeom>
+        </p:spPr>
+        <p:txBody>
+          <a:bodyPr vert="horz" lIns="91440" tIns="45720" rIns="91440" bIns="45720" rtlCol="0" anchor="b"/>
+          <a:lstStyle>
+            <a:lvl1pPr algn="r">
+              <a:defRPr sz="1200"/>
+            </a:lvl1pPr>
+          </a:lstStyle>
+          <a:p>
+            <a:fld id="{44DB47AF-0A5A-5D4B-8232-81602AE7243C}" type="slidenum">
+              <a:rPr lang="en-US" smtClean="0"/>
+              <a:t>‹#›</a:t>
+            </a:fld>
+            <a:endParaRPr lang="en-US"/>
+          </a:p>
+        </p:txBody>
+      </p:sp>
+    </p:spTree>
+    <p:extLst>
+      <p:ext uri="{BB962C8B-B14F-4D97-AF65-F5344CB8AC3E}">
+        <p14:creationId xmlns:p14="http://schemas.microsoft.com/office/powerpoint/2010/main" val="335602743"/>
+      </p:ext>
+    </p:extLst>
+  </p:cSld>
+  <p:clrMap bg1="lt1" tx1="dk1" bg2="lt2" tx2="dk2" accent1="accent1" accent2="accent2" accent3="accent3" accent4="accent4" accent5="accent5" accent6="accent6" hlink="hlink" folHlink="folHlink"/>
+  <p:notesStyle>
+    <a:lvl1pPr marL="0" algn="l" defTabSz="685800" rtl="0" eaLnBrk="1" latinLnBrk="0" hangingPunct="1">
+      <a:defRPr sz="900" kern="1200">
+        <a:solidFill>
+          <a:schemeClr val="tx1"/>
+        </a:solidFill>
+        <a:latin typeface="+mn-lt"/>
+        <a:ea typeface="+mn-ea"/>
+        <a:cs typeface="+mn-cs"/>
+      </a:defRPr>
+    </a:lvl1pPr>
+    <a:lvl2pPr marL="342900" algn="l" defTabSz="685800" rtl="0" eaLnBrk="1" latinLnBrk="0" hangingPunct="1">
+      <a:defRPr sz="900" kern="1200">
+        <a:solidFill>
+          <a:schemeClr val="tx1"/>
+        </a:solidFill>
+        <a:latin typeface="+mn-lt"/>
+        <a:ea typeface="+mn-ea"/>
+        <a:cs typeface="+mn-cs"/>
+      </a:defRPr>
+    </a:lvl2pPr>
+    <a:lvl3pPr marL="685800" algn="l" defTabSz="685800" rtl="0" eaLnBrk="1" latinLnBrk="0" hangingPunct="1">
+      <a:defRPr sz="900" kern="1200">
+        <a:solidFill>
+          <a:schemeClr val="tx1"/>
+        </a:solidFill>
+        <a:latin typeface="+mn-lt"/>
+        <a:ea typeface="+mn-ea"/>
+        <a:cs typeface="+mn-cs"/>
+      </a:defRPr>
+    </a:lvl3pPr>
+    <a:lvl4pPr marL="1028700" algn="l" defTabSz="685800" rtl="0" eaLnBrk="1" latinLnBrk="0" hangingPunct="1">
+      <a:defRPr sz="900" kern="1200">
+        <a:solidFill>
+          <a:schemeClr val="tx1"/>
+        </a:solidFill>
+        <a:latin typeface="+mn-lt"/>
+        <a:ea typeface="+mn-ea"/>
+        <a:cs typeface="+mn-cs"/>
+      </a:defRPr>
+    </a:lvl4pPr>
+    <a:lvl5pPr marL="1371600" algn="l" defTabSz="685800" rtl="0" eaLnBrk="1" latinLnBrk="0" hangingPunct="1">
+      <a:defRPr sz="900" kern="1200">
+        <a:solidFill>
+          <a:schemeClr val="tx1"/>
+        </a:solidFill>
+        <a:latin typeface="+mn-lt"/>
+        <a:ea typeface="+mn-ea"/>
+        <a:cs typeface="+mn-cs"/>
+      </a:defRPr>
+    </a:lvl5pPr>
+    <a:lvl6pPr marL="1714500" algn="l" defTabSz="685800" rtl="0" eaLnBrk="1" latinLnBrk="0" hangingPunct="1">
+      <a:defRPr sz="900" kern="1200">
+        <a:solidFill>
+          <a:schemeClr val="tx1"/>
+        </a:solidFill>
+        <a:latin typeface="+mn-lt"/>
+        <a:ea typeface="+mn-ea"/>
+        <a:cs typeface="+mn-cs"/>
+      </a:defRPr>
+    </a:lvl6pPr>
+    <a:lvl7pPr marL="2057400" algn="l" defTabSz="685800" rtl="0" eaLnBrk="1" latinLnBrk="0" hangingPunct="1">
+      <a:defRPr sz="900" kern="1200">
+        <a:solidFill>
+          <a:schemeClr val="tx1"/>
+        </a:solidFill>
+        <a:latin typeface="+mn-lt"/>
+        <a:ea typeface="+mn-ea"/>
+        <a:cs typeface="+mn-cs"/>
+      </a:defRPr>
+    </a:lvl7pPr>
+    <a:lvl8pPr marL="2400300" algn="l" defTabSz="685800" rtl="0" eaLnBrk="1" latinLnBrk="0" hangingPunct="1">
+      <a:defRPr sz="900" kern="1200">
+        <a:solidFill>
+          <a:schemeClr val="tx1"/>
+        </a:solidFill>
+        <a:latin typeface="+mn-lt"/>
+        <a:ea typeface="+mn-ea"/>
+        <a:cs typeface="+mn-cs"/>
+      </a:defRPr>
+    </a:lvl8pPr>
+    <a:lvl9pPr marL="2743200" algn="l" defTabSz="685800" rtl="0" eaLnBrk="1" latinLnBrk="0" hangingPunct="1">
+      <a:defRPr sz="900" kern="1200">
+        <a:solidFill>
+          <a:schemeClr val="tx1"/>
+        </a:solidFill>
+        <a:latin typeface="+mn-lt"/>
+        <a:ea typeface="+mn-ea"/>
+        <a:cs typeface="+mn-cs"/>
+      </a:defRPr>
+    </a:lvl9pPr>
+  </p:notesStyle>
+</p:notesMaster>
+</file>
+
+<file path=ppt/notesSlides/notesSlide1.xml><?xml version="1.0" encoding="utf-8"?>
+<p:notes xmlns:a="http://schemas.openxmlformats.org/drawingml/2006/main" xmlns:r="http://schemas.openxmlformats.org/officeDocument/2006/relationships" xmlns:p="http://schemas.openxmlformats.org/presentationml/2006/main">
+  <p:cSld>
+    <p:spTree>
+      <p:nvGrpSpPr>
+        <p:cNvPr id="1" name=""/>
+        <p:cNvGrpSpPr/>
+        <p:nvPr/>
+      </p:nvGrpSpPr>
+      <p:grpSpPr>
+        <a:xfrm>
+          <a:off x="0" y="0"/>
+          <a:ext cx="0" cy="0"/>
+          <a:chOff x="0" y="0"/>
+          <a:chExt cx="0" cy="0"/>
+        </a:xfrm>
+      </p:grpSpPr>
+      <p:sp>
+        <p:nvSpPr>
+          <p:cNvPr id="2" name="Slide Image Placeholder 1"/>
+          <p:cNvSpPr>
+            <a:spLocks noGrp="1" noRot="1" noChangeAspect="1"/>
+          </p:cNvSpPr>
+          <p:nvPr>
+            <p:ph type="sldImg"/>
+          </p:nvPr>
+        </p:nvSpPr>
+        <p:spPr/>
+      </p:sp>
+      <p:sp>
+        <p:nvSpPr>
+          <p:cNvPr id="3" name="Notes Placeholder 2"/>
+          <p:cNvSpPr>
+            <a:spLocks noGrp="1"/>
+          </p:cNvSpPr>
+          <p:nvPr>
+            <p:ph type="body" idx="1"/>
+          </p:nvPr>
+        </p:nvSpPr>
+        <p:spPr/>
+        <p:txBody>
+          <a:bodyPr/>
+          <a:lstStyle/>
+          <a:p>
+            <a:r>
+              <a:rPr lang="en-US" dirty="0"/>
+              <a:t>Yogi Berra </a:t>
+            </a:r>
+          </a:p>
+        </p:txBody>
+      </p:sp>
+      <p:sp>
+        <p:nvSpPr>
+          <p:cNvPr id="4" name="Slide Number Placeholder 3"/>
+          <p:cNvSpPr>
+            <a:spLocks noGrp="1"/>
+          </p:cNvSpPr>
+          <p:nvPr>
+            <p:ph type="sldNum" sz="quarter" idx="10"/>
+          </p:nvPr>
+        </p:nvSpPr>
+        <p:spPr/>
+        <p:txBody>
+          <a:bodyPr/>
+          <a:lstStyle/>
+          <a:p>
+            <a:fld id="{44DB47AF-0A5A-5D4B-8232-81602AE7243C}" type="slidenum">
+              <a:rPr lang="en-US" smtClean="0"/>
+              <a:t>3</a:t>
+            </a:fld>
+            <a:endParaRPr lang="en-US"/>
+          </a:p>
+        </p:txBody>
+      </p:sp>
+    </p:spTree>
+    <p:extLst>
+      <p:ext uri="{BB962C8B-B14F-4D97-AF65-F5344CB8AC3E}">
+        <p14:creationId xmlns:p14="http://schemas.microsoft.com/office/powerpoint/2010/main" val="3343503307"/>
+      </p:ext>
+    </p:extLst>
+  </p:cSld>
+  <p:clrMapOvr>
+    <a:masterClrMapping/>
+  </p:clrMapOvr>
+</p:notes>
 </file>
 
 <file path=ppt/slideLayouts/slideLayout1.xml><?xml version="1.0" encoding="utf-8"?>
@@ -166,8 +605,8 @@
         </p:nvSpPr>
         <p:spPr>
           <a:xfrm>
-            <a:off x="228598" y="1929183"/>
-            <a:ext cx="8382001" cy="2387600"/>
+            <a:off x="171449" y="1446887"/>
+            <a:ext cx="6286501" cy="1790700"/>
           </a:xfrm>
         </p:spPr>
         <p:txBody>
@@ -176,7 +615,7 @@
           </a:bodyPr>
           <a:lstStyle>
             <a:lvl1pPr algn="l">
-              <a:defRPr sz="5400"/>
+              <a:defRPr sz="4050"/>
             </a:lvl1pPr>
           </a:lstStyle>
           <a:p>
@@ -205,8 +644,8 @@
         </p:nvSpPr>
         <p:spPr>
           <a:xfrm>
-            <a:off x="228598" y="4359647"/>
-            <a:ext cx="8382001" cy="1655762"/>
+            <a:off x="171449" y="3269735"/>
+            <a:ext cx="6286501" cy="1241822"/>
           </a:xfrm>
         </p:spPr>
         <p:txBody>
@@ -214,7 +653,7 @@
           <a:lstStyle>
             <a:lvl1pPr marL="0" indent="0" algn="l">
               <a:buNone/>
-              <a:defRPr sz="2400">
+              <a:defRPr sz="1800">
                 <a:solidFill>
                   <a:schemeClr val="bg1">
                     <a:lumMod val="85000"/>
@@ -222,37 +661,37 @@
                 </a:solidFill>
               </a:defRPr>
             </a:lvl1pPr>
-            <a:lvl2pPr marL="457200" indent="0" algn="ctr">
+            <a:lvl2pPr marL="342900" indent="0" algn="ctr">
               <a:buNone/>
-              <a:defRPr sz="2000"/>
+              <a:defRPr sz="1500"/>
             </a:lvl2pPr>
-            <a:lvl3pPr marL="914400" indent="0" algn="ctr">
+            <a:lvl3pPr marL="685800" indent="0" algn="ctr">
               <a:buNone/>
-              <a:defRPr sz="1800"/>
+              <a:defRPr sz="1350"/>
             </a:lvl3pPr>
-            <a:lvl4pPr marL="1371600" indent="0" algn="ctr">
+            <a:lvl4pPr marL="1028700" indent="0" algn="ctr">
               <a:buNone/>
-              <a:defRPr sz="1600"/>
+              <a:defRPr sz="1200"/>
             </a:lvl4pPr>
-            <a:lvl5pPr marL="1828800" indent="0" algn="ctr">
+            <a:lvl5pPr marL="1371600" indent="0" algn="ctr">
               <a:buNone/>
-              <a:defRPr sz="1600"/>
+              <a:defRPr sz="1200"/>
             </a:lvl5pPr>
-            <a:lvl6pPr marL="2286000" indent="0" algn="ctr">
+            <a:lvl6pPr marL="1714500" indent="0" algn="ctr">
               <a:buNone/>
-              <a:defRPr sz="1600"/>
+              <a:defRPr sz="1200"/>
             </a:lvl6pPr>
-            <a:lvl7pPr marL="2743200" indent="0" algn="ctr">
+            <a:lvl7pPr marL="2057400" indent="0" algn="ctr">
               <a:buNone/>
-              <a:defRPr sz="1600"/>
+              <a:defRPr sz="1200"/>
             </a:lvl7pPr>
-            <a:lvl8pPr marL="3200400" indent="0" algn="ctr">
+            <a:lvl8pPr marL="2400300" indent="0" algn="ctr">
               <a:buNone/>
-              <a:defRPr sz="1600"/>
+              <a:defRPr sz="1200"/>
             </a:lvl8pPr>
-            <a:lvl9pPr marL="3657600" indent="0" algn="ctr">
+            <a:lvl9pPr marL="2743200" indent="0" algn="ctr">
               <a:buNone/>
-              <a:defRPr sz="1600"/>
+              <a:defRPr sz="1200"/>
             </a:lvl9pPr>
           </a:lstStyle>
           <a:p>
@@ -408,8 +847,8 @@
         </p:nvSpPr>
         <p:spPr>
           <a:xfrm>
-            <a:off x="228598" y="1929183"/>
-            <a:ext cx="8382001" cy="2387600"/>
+            <a:off x="171449" y="1446887"/>
+            <a:ext cx="6286501" cy="1790700"/>
           </a:xfrm>
         </p:spPr>
         <p:txBody>
@@ -418,7 +857,7 @@
           </a:bodyPr>
           <a:lstStyle>
             <a:lvl1pPr algn="l">
-              <a:defRPr sz="5400">
+              <a:defRPr sz="4050">
                 <a:solidFill>
                   <a:schemeClr val="tx1">
                     <a:lumMod val="85000"/>
@@ -454,8 +893,8 @@
         </p:nvSpPr>
         <p:spPr>
           <a:xfrm>
-            <a:off x="228598" y="4359647"/>
-            <a:ext cx="8382001" cy="1655762"/>
+            <a:off x="171449" y="3269735"/>
+            <a:ext cx="6286501" cy="1241822"/>
           </a:xfrm>
         </p:spPr>
         <p:txBody>
@@ -463,7 +902,7 @@
           <a:lstStyle>
             <a:lvl1pPr marL="0" indent="0" algn="l">
               <a:buNone/>
-              <a:defRPr sz="2400">
+              <a:defRPr sz="1800">
                 <a:solidFill>
                   <a:schemeClr val="tx1">
                     <a:lumMod val="75000"/>
@@ -472,37 +911,37 @@
                 </a:solidFill>
               </a:defRPr>
             </a:lvl1pPr>
-            <a:lvl2pPr marL="457200" indent="0" algn="ctr">
+            <a:lvl2pPr marL="342900" indent="0" algn="ctr">
               <a:buNone/>
-              <a:defRPr sz="2000"/>
+              <a:defRPr sz="1500"/>
             </a:lvl2pPr>
-            <a:lvl3pPr marL="914400" indent="0" algn="ctr">
+            <a:lvl3pPr marL="685800" indent="0" algn="ctr">
               <a:buNone/>
-              <a:defRPr sz="1800"/>
+              <a:defRPr sz="1350"/>
             </a:lvl3pPr>
-            <a:lvl4pPr marL="1371600" indent="0" algn="ctr">
+            <a:lvl4pPr marL="1028700" indent="0" algn="ctr">
               <a:buNone/>
-              <a:defRPr sz="1600"/>
+              <a:defRPr sz="1200"/>
             </a:lvl4pPr>
-            <a:lvl5pPr marL="1828800" indent="0" algn="ctr">
+            <a:lvl5pPr marL="1371600" indent="0" algn="ctr">
               <a:buNone/>
-              <a:defRPr sz="1600"/>
+              <a:defRPr sz="1200"/>
             </a:lvl5pPr>
-            <a:lvl6pPr marL="2286000" indent="0" algn="ctr">
+            <a:lvl6pPr marL="1714500" indent="0" algn="ctr">
               <a:buNone/>
-              <a:defRPr sz="1600"/>
+              <a:defRPr sz="1200"/>
             </a:lvl6pPr>
-            <a:lvl7pPr marL="2743200" indent="0" algn="ctr">
+            <a:lvl7pPr marL="2057400" indent="0" algn="ctr">
               <a:buNone/>
-              <a:defRPr sz="1600"/>
+              <a:defRPr sz="1200"/>
             </a:lvl7pPr>
-            <a:lvl8pPr marL="3200400" indent="0" algn="ctr">
+            <a:lvl8pPr marL="2400300" indent="0" algn="ctr">
               <a:buNone/>
-              <a:defRPr sz="1600"/>
+              <a:defRPr sz="1200"/>
             </a:lvl8pPr>
-            <a:lvl9pPr marL="3657600" indent="0" algn="ctr">
+            <a:lvl9pPr marL="2743200" indent="0" algn="ctr">
               <a:buNone/>
-              <a:defRPr sz="1600"/>
+              <a:defRPr sz="1200"/>
             </a:lvl9pPr>
           </a:lstStyle>
           <a:p>
@@ -693,8 +1132,8 @@
         </p:nvSpPr>
         <p:spPr>
           <a:xfrm>
-            <a:off x="217954" y="61357"/>
-            <a:ext cx="10515600" cy="1325563"/>
+            <a:off x="163466" y="46018"/>
+            <a:ext cx="7886700" cy="994172"/>
           </a:xfrm>
         </p:spPr>
         <p:txBody>
@@ -726,8 +1165,8 @@
         </p:nvSpPr>
         <p:spPr>
           <a:xfrm>
-            <a:off x="417979" y="1482725"/>
-            <a:ext cx="10515600" cy="4351338"/>
+            <a:off x="313484" y="1112044"/>
+            <a:ext cx="7886700" cy="3263504"/>
           </a:xfrm>
         </p:spPr>
         <p:txBody>
@@ -961,8 +1400,8 @@
         </p:nvSpPr>
         <p:spPr>
           <a:xfrm>
-            <a:off x="217954" y="128592"/>
-            <a:ext cx="10515600" cy="1325563"/>
+            <a:off x="163466" y="96445"/>
+            <a:ext cx="7886700" cy="994172"/>
           </a:xfrm>
         </p:spPr>
         <p:txBody>
@@ -994,8 +1433,8 @@
         </p:nvSpPr>
         <p:spPr>
           <a:xfrm>
-            <a:off x="417979" y="1482725"/>
-            <a:ext cx="10515600" cy="4351338"/>
+            <a:off x="313484" y="1112044"/>
+            <a:ext cx="7886700" cy="3263504"/>
           </a:xfrm>
         </p:spPr>
         <p:txBody>
@@ -1269,8 +1708,8 @@
         </p:nvSpPr>
         <p:spPr>
           <a:xfrm>
-            <a:off x="2007674" y="1236663"/>
-            <a:ext cx="8176653" cy="2387600"/>
+            <a:off x="1505756" y="927497"/>
+            <a:ext cx="6132490" cy="1790700"/>
           </a:xfrm>
         </p:spPr>
         <p:txBody>
@@ -1279,7 +1718,7 @@
           </a:bodyPr>
           <a:lstStyle>
             <a:lvl1pPr algn="ctr">
-              <a:defRPr sz="5400"/>
+              <a:defRPr sz="4050"/>
             </a:lvl1pPr>
           </a:lstStyle>
           <a:p>
@@ -1308,8 +1747,8 @@
         </p:nvSpPr>
         <p:spPr>
           <a:xfrm>
-            <a:off x="2007674" y="3667127"/>
-            <a:ext cx="8176653" cy="1655762"/>
+            <a:off x="1505756" y="2750345"/>
+            <a:ext cx="6132490" cy="1241822"/>
           </a:xfrm>
         </p:spPr>
         <p:txBody>
@@ -1317,7 +1756,7 @@
           <a:lstStyle>
             <a:lvl1pPr marL="0" indent="0" algn="ctr">
               <a:buNone/>
-              <a:defRPr sz="2400">
+              <a:defRPr sz="1800">
                 <a:solidFill>
                   <a:schemeClr val="bg1">
                     <a:lumMod val="85000"/>
@@ -1325,37 +1764,37 @@
                 </a:solidFill>
               </a:defRPr>
             </a:lvl1pPr>
-            <a:lvl2pPr marL="457200" indent="0" algn="ctr">
+            <a:lvl2pPr marL="342900" indent="0" algn="ctr">
               <a:buNone/>
-              <a:defRPr sz="2000"/>
+              <a:defRPr sz="1500"/>
             </a:lvl2pPr>
-            <a:lvl3pPr marL="914400" indent="0" algn="ctr">
+            <a:lvl3pPr marL="685800" indent="0" algn="ctr">
               <a:buNone/>
-              <a:defRPr sz="1800"/>
+              <a:defRPr sz="1350"/>
             </a:lvl3pPr>
-            <a:lvl4pPr marL="1371600" indent="0" algn="ctr">
+            <a:lvl4pPr marL="1028700" indent="0" algn="ctr">
               <a:buNone/>
-              <a:defRPr sz="1600"/>
+              <a:defRPr sz="1200"/>
             </a:lvl4pPr>
-            <a:lvl5pPr marL="1828800" indent="0" algn="ctr">
+            <a:lvl5pPr marL="1371600" indent="0" algn="ctr">
               <a:buNone/>
-              <a:defRPr sz="1600"/>
+              <a:defRPr sz="1200"/>
             </a:lvl5pPr>
-            <a:lvl6pPr marL="2286000" indent="0" algn="ctr">
+            <a:lvl6pPr marL="1714500" indent="0" algn="ctr">
               <a:buNone/>
-              <a:defRPr sz="1600"/>
+              <a:defRPr sz="1200"/>
             </a:lvl6pPr>
-            <a:lvl7pPr marL="2743200" indent="0" algn="ctr">
+            <a:lvl7pPr marL="2057400" indent="0" algn="ctr">
               <a:buNone/>
-              <a:defRPr sz="1600"/>
+              <a:defRPr sz="1200"/>
             </a:lvl7pPr>
-            <a:lvl8pPr marL="3200400" indent="0" algn="ctr">
+            <a:lvl8pPr marL="2400300" indent="0" algn="ctr">
               <a:buNone/>
-              <a:defRPr sz="1600"/>
+              <a:defRPr sz="1200"/>
             </a:lvl8pPr>
-            <a:lvl9pPr marL="3657600" indent="0" algn="ctr">
+            <a:lvl9pPr marL="2743200" indent="0" algn="ctr">
               <a:buNone/>
-              <a:defRPr sz="1600"/>
+              <a:defRPr sz="1200"/>
             </a:lvl9pPr>
           </a:lstStyle>
           <a:p>
@@ -1511,8 +1950,8 @@
         </p:nvSpPr>
         <p:spPr>
           <a:xfrm>
-            <a:off x="2007674" y="1236663"/>
-            <a:ext cx="8176653" cy="2387600"/>
+            <a:off x="1505756" y="927497"/>
+            <a:ext cx="6132490" cy="1790700"/>
           </a:xfrm>
         </p:spPr>
         <p:txBody>
@@ -1521,7 +1960,7 @@
           </a:bodyPr>
           <a:lstStyle>
             <a:lvl1pPr algn="ctr">
-              <a:defRPr sz="5400">
+              <a:defRPr sz="4050">
                 <a:solidFill>
                   <a:schemeClr val="tx1">
                     <a:lumMod val="85000"/>
@@ -1557,8 +1996,8 @@
         </p:nvSpPr>
         <p:spPr>
           <a:xfrm>
-            <a:off x="2007674" y="3667127"/>
-            <a:ext cx="8176653" cy="1655762"/>
+            <a:off x="1505756" y="2750345"/>
+            <a:ext cx="6132490" cy="1241822"/>
           </a:xfrm>
         </p:spPr>
         <p:txBody>
@@ -1566,7 +2005,7 @@
           <a:lstStyle>
             <a:lvl1pPr marL="0" indent="0" algn="ctr">
               <a:buNone/>
-              <a:defRPr sz="2400">
+              <a:defRPr sz="1800">
                 <a:solidFill>
                   <a:schemeClr val="tx1">
                     <a:lumMod val="75000"/>
@@ -1575,37 +2014,37 @@
                 </a:solidFill>
               </a:defRPr>
             </a:lvl1pPr>
-            <a:lvl2pPr marL="457200" indent="0" algn="ctr">
+            <a:lvl2pPr marL="342900" indent="0" algn="ctr">
               <a:buNone/>
-              <a:defRPr sz="2000"/>
+              <a:defRPr sz="1500"/>
             </a:lvl2pPr>
-            <a:lvl3pPr marL="914400" indent="0" algn="ctr">
+            <a:lvl3pPr marL="685800" indent="0" algn="ctr">
               <a:buNone/>
-              <a:defRPr sz="1800"/>
+              <a:defRPr sz="1350"/>
             </a:lvl3pPr>
-            <a:lvl4pPr marL="1371600" indent="0" algn="ctr">
+            <a:lvl4pPr marL="1028700" indent="0" algn="ctr">
               <a:buNone/>
-              <a:defRPr sz="1600"/>
+              <a:defRPr sz="1200"/>
             </a:lvl4pPr>
-            <a:lvl5pPr marL="1828800" indent="0" algn="ctr">
+            <a:lvl5pPr marL="1371600" indent="0" algn="ctr">
               <a:buNone/>
-              <a:defRPr sz="1600"/>
+              <a:defRPr sz="1200"/>
             </a:lvl5pPr>
-            <a:lvl6pPr marL="2286000" indent="0" algn="ctr">
+            <a:lvl6pPr marL="1714500" indent="0" algn="ctr">
               <a:buNone/>
-              <a:defRPr sz="1600"/>
+              <a:defRPr sz="1200"/>
             </a:lvl6pPr>
-            <a:lvl7pPr marL="2743200" indent="0" algn="ctr">
+            <a:lvl7pPr marL="2057400" indent="0" algn="ctr">
               <a:buNone/>
-              <a:defRPr sz="1600"/>
+              <a:defRPr sz="1200"/>
             </a:lvl7pPr>
-            <a:lvl8pPr marL="3200400" indent="0" algn="ctr">
+            <a:lvl8pPr marL="2400300" indent="0" algn="ctr">
               <a:buNone/>
-              <a:defRPr sz="1600"/>
+              <a:defRPr sz="1200"/>
             </a:lvl8pPr>
-            <a:lvl9pPr marL="3657600" indent="0" algn="ctr">
+            <a:lvl9pPr marL="2743200" indent="0" algn="ctr">
               <a:buNone/>
-              <a:defRPr sz="1600"/>
+              <a:defRPr sz="1200"/>
             </a:lvl9pPr>
           </a:lstStyle>
           <a:p>
@@ -1796,8 +2235,8 @@
         </p:nvSpPr>
         <p:spPr>
           <a:xfrm>
-            <a:off x="123825" y="128592"/>
-            <a:ext cx="10515600" cy="1325563"/>
+            <a:off x="92869" y="96445"/>
+            <a:ext cx="7886700" cy="994172"/>
           </a:xfrm>
           <a:prstGeom prst="rect">
             <a:avLst/>
@@ -1834,8 +2273,8 @@
         </p:nvSpPr>
         <p:spPr>
           <a:xfrm>
-            <a:off x="323850" y="1482725"/>
-            <a:ext cx="10515600" cy="4351338"/>
+            <a:off x="242888" y="1112044"/>
+            <a:ext cx="7886700" cy="3263504"/>
           </a:xfrm>
           <a:prstGeom prst="rect">
             <a:avLst/>
@@ -1901,8 +2340,8 @@
         </p:nvSpPr>
         <p:spPr>
           <a:xfrm>
-            <a:off x="838200" y="6356350"/>
-            <a:ext cx="2743200" cy="365125"/>
+            <a:off x="628650" y="4767263"/>
+            <a:ext cx="2057400" cy="273844"/>
           </a:xfrm>
           <a:prstGeom prst="rect">
             <a:avLst/>
@@ -1912,7 +2351,7 @@
           <a:bodyPr vert="horz" lIns="91440" tIns="45720" rIns="91440" bIns="45720" rtlCol="0" anchor="ctr"/>
           <a:lstStyle>
             <a:lvl1pPr algn="l">
-              <a:defRPr sz="1200">
+              <a:defRPr sz="900">
                 <a:solidFill>
                   <a:schemeClr val="bg1"/>
                 </a:solidFill>
@@ -1949,8 +2388,8 @@
         </p:nvSpPr>
         <p:spPr>
           <a:xfrm>
-            <a:off x="4038600" y="6356350"/>
-            <a:ext cx="4114800" cy="365125"/>
+            <a:off x="3028950" y="4767263"/>
+            <a:ext cx="3086100" cy="273844"/>
           </a:xfrm>
           <a:prstGeom prst="rect">
             <a:avLst/>
@@ -1960,7 +2399,7 @@
           <a:bodyPr vert="horz" lIns="91440" tIns="45720" rIns="91440" bIns="45720" rtlCol="0" anchor="ctr"/>
           <a:lstStyle>
             <a:lvl1pPr algn="ctr">
-              <a:defRPr sz="1200">
+              <a:defRPr sz="900">
                 <a:solidFill>
                   <a:schemeClr val="bg1"/>
                 </a:solidFill>
@@ -1992,8 +2431,8 @@
         </p:nvSpPr>
         <p:spPr>
           <a:xfrm>
-            <a:off x="8610600" y="6356350"/>
-            <a:ext cx="2743200" cy="365125"/>
+            <a:off x="6457950" y="4767263"/>
+            <a:ext cx="2057400" cy="273844"/>
           </a:xfrm>
           <a:prstGeom prst="rect">
             <a:avLst/>
@@ -2003,7 +2442,7 @@
           <a:bodyPr vert="horz" lIns="91440" tIns="45720" rIns="91440" bIns="45720" rtlCol="0" anchor="ctr"/>
           <a:lstStyle>
             <a:lvl1pPr algn="r">
-              <a:defRPr sz="1200">
+              <a:defRPr sz="900">
                 <a:solidFill>
                   <a:schemeClr val="bg1"/>
                 </a:solidFill>
@@ -2040,7 +2479,7 @@
   </p:sldLayoutIdLst>
   <p:txStyles>
     <p:titleStyle>
-      <a:lvl1pPr algn="l" defTabSz="914400" rtl="0" eaLnBrk="1" latinLnBrk="0" hangingPunct="1">
+      <a:lvl1pPr algn="l" defTabSz="685800" rtl="0" eaLnBrk="1" latinLnBrk="0" hangingPunct="1">
         <a:lnSpc>
           <a:spcPct val="90000"/>
         </a:lnSpc>
@@ -2048,7 +2487,7 @@
           <a:spcPct val="0"/>
         </a:spcBef>
         <a:buNone/>
-        <a:defRPr sz="4400" b="0" i="0" kern="1200">
+        <a:defRPr sz="3300" b="0" i="0" kern="1200">
           <a:solidFill>
             <a:schemeClr val="bg1"/>
           </a:solidFill>
@@ -2059,48 +2498,12 @@
       </a:lvl1pPr>
     </p:titleStyle>
     <p:bodyStyle>
-      <a:lvl1pPr marL="228600" indent="-228600" algn="l" defTabSz="914400" rtl="0" eaLnBrk="1" latinLnBrk="0" hangingPunct="1">
+      <a:lvl1pPr marL="171450" indent="-171450" algn="l" defTabSz="685800" rtl="0" eaLnBrk="1" latinLnBrk="0" hangingPunct="1">
         <a:lnSpc>
           <a:spcPct val="90000"/>
         </a:lnSpc>
         <a:spcBef>
-          <a:spcPts val="1000"/>
-        </a:spcBef>
-        <a:buFont typeface="Arial" panose="020B0604020202020204" pitchFamily="34" charset="0"/>
-        <a:buChar char="•"/>
-        <a:defRPr sz="3200" b="0" i="0" kern="1200">
-          <a:solidFill>
-            <a:schemeClr val="bg1"/>
-          </a:solidFill>
-          <a:latin typeface="Roboto" panose="02000000000000000000" pitchFamily="2" charset="0"/>
-          <a:ea typeface="Roboto" panose="02000000000000000000" pitchFamily="2" charset="0"/>
-          <a:cs typeface="+mn-cs"/>
-        </a:defRPr>
-      </a:lvl1pPr>
-      <a:lvl2pPr marL="685800" indent="-228600" algn="l" defTabSz="914400" rtl="0" eaLnBrk="1" latinLnBrk="0" hangingPunct="1">
-        <a:lnSpc>
-          <a:spcPct val="90000"/>
-        </a:lnSpc>
-        <a:spcBef>
-          <a:spcPts val="500"/>
-        </a:spcBef>
-        <a:buFont typeface="Arial" panose="020B0604020202020204" pitchFamily="34" charset="0"/>
-        <a:buChar char="•"/>
-        <a:defRPr sz="2800" b="0" i="0" kern="1200">
-          <a:solidFill>
-            <a:schemeClr val="bg1"/>
-          </a:solidFill>
-          <a:latin typeface="Roboto" panose="02000000000000000000" pitchFamily="2" charset="0"/>
-          <a:ea typeface="Roboto" panose="02000000000000000000" pitchFamily="2" charset="0"/>
-          <a:cs typeface="+mn-cs"/>
-        </a:defRPr>
-      </a:lvl2pPr>
-      <a:lvl3pPr marL="1143000" indent="-228600" algn="l" defTabSz="914400" rtl="0" eaLnBrk="1" latinLnBrk="0" hangingPunct="1">
-        <a:lnSpc>
-          <a:spcPct val="90000"/>
-        </a:lnSpc>
-        <a:spcBef>
-          <a:spcPts val="500"/>
+          <a:spcPts val="750"/>
         </a:spcBef>
         <a:buFont typeface="Arial" panose="020B0604020202020204" pitchFamily="34" charset="0"/>
         <a:buChar char="•"/>
@@ -2112,17 +2515,53 @@
           <a:ea typeface="Roboto" panose="02000000000000000000" pitchFamily="2" charset="0"/>
           <a:cs typeface="+mn-cs"/>
         </a:defRPr>
-      </a:lvl3pPr>
-      <a:lvl4pPr marL="1600200" indent="-228600" algn="l" defTabSz="914400" rtl="0" eaLnBrk="1" latinLnBrk="0" hangingPunct="1">
+      </a:lvl1pPr>
+      <a:lvl2pPr marL="514350" indent="-171450" algn="l" defTabSz="685800" rtl="0" eaLnBrk="1" latinLnBrk="0" hangingPunct="1">
         <a:lnSpc>
           <a:spcPct val="90000"/>
         </a:lnSpc>
         <a:spcBef>
-          <a:spcPts val="500"/>
+          <a:spcPts val="375"/>
         </a:spcBef>
         <a:buFont typeface="Arial" panose="020B0604020202020204" pitchFamily="34" charset="0"/>
         <a:buChar char="•"/>
-        <a:defRPr sz="2000" b="0" i="0" kern="1200">
+        <a:defRPr sz="2100" b="0" i="0" kern="1200">
+          <a:solidFill>
+            <a:schemeClr val="bg1"/>
+          </a:solidFill>
+          <a:latin typeface="Roboto" panose="02000000000000000000" pitchFamily="2" charset="0"/>
+          <a:ea typeface="Roboto" panose="02000000000000000000" pitchFamily="2" charset="0"/>
+          <a:cs typeface="+mn-cs"/>
+        </a:defRPr>
+      </a:lvl2pPr>
+      <a:lvl3pPr marL="857250" indent="-171450" algn="l" defTabSz="685800" rtl="0" eaLnBrk="1" latinLnBrk="0" hangingPunct="1">
+        <a:lnSpc>
+          <a:spcPct val="90000"/>
+        </a:lnSpc>
+        <a:spcBef>
+          <a:spcPts val="375"/>
+        </a:spcBef>
+        <a:buFont typeface="Arial" panose="020B0604020202020204" pitchFamily="34" charset="0"/>
+        <a:buChar char="•"/>
+        <a:defRPr sz="1800" b="0" i="0" kern="1200">
+          <a:solidFill>
+            <a:schemeClr val="bg1"/>
+          </a:solidFill>
+          <a:latin typeface="Roboto" panose="02000000000000000000" pitchFamily="2" charset="0"/>
+          <a:ea typeface="Roboto" panose="02000000000000000000" pitchFamily="2" charset="0"/>
+          <a:cs typeface="+mn-cs"/>
+        </a:defRPr>
+      </a:lvl3pPr>
+      <a:lvl4pPr marL="1200150" indent="-171450" algn="l" defTabSz="685800" rtl="0" eaLnBrk="1" latinLnBrk="0" hangingPunct="1">
+        <a:lnSpc>
+          <a:spcPct val="90000"/>
+        </a:lnSpc>
+        <a:spcBef>
+          <a:spcPts val="375"/>
+        </a:spcBef>
+        <a:buFont typeface="Arial" panose="020B0604020202020204" pitchFamily="34" charset="0"/>
+        <a:buChar char="•"/>
+        <a:defRPr sz="1500" b="0" i="0" kern="1200">
           <a:solidFill>
             <a:schemeClr val="bg1"/>
           </a:solidFill>
@@ -2131,16 +2570,16 @@
           <a:cs typeface="+mn-cs"/>
         </a:defRPr>
       </a:lvl4pPr>
-      <a:lvl5pPr marL="2057400" indent="-228600" algn="l" defTabSz="914400" rtl="0" eaLnBrk="1" latinLnBrk="0" hangingPunct="1">
+      <a:lvl5pPr marL="1543050" indent="-171450" algn="l" defTabSz="685800" rtl="0" eaLnBrk="1" latinLnBrk="0" hangingPunct="1">
         <a:lnSpc>
           <a:spcPct val="90000"/>
         </a:lnSpc>
         <a:spcBef>
-          <a:spcPts val="500"/>
+          <a:spcPts val="375"/>
         </a:spcBef>
         <a:buFont typeface="Arial" panose="020B0604020202020204" pitchFamily="34" charset="0"/>
         <a:buChar char="•"/>
-        <a:defRPr sz="2000" b="0" i="0" kern="1200">
+        <a:defRPr sz="1500" b="0" i="0" kern="1200">
           <a:solidFill>
             <a:schemeClr val="bg1"/>
           </a:solidFill>
@@ -2149,16 +2588,16 @@
           <a:cs typeface="+mn-cs"/>
         </a:defRPr>
       </a:lvl5pPr>
-      <a:lvl6pPr marL="2514600" indent="-228600" algn="l" defTabSz="914400" rtl="0" eaLnBrk="1" latinLnBrk="0" hangingPunct="1">
+      <a:lvl6pPr marL="1885950" indent="-171450" algn="l" defTabSz="685800" rtl="0" eaLnBrk="1" latinLnBrk="0" hangingPunct="1">
         <a:lnSpc>
           <a:spcPct val="90000"/>
         </a:lnSpc>
         <a:spcBef>
-          <a:spcPts val="500"/>
+          <a:spcPts val="375"/>
         </a:spcBef>
         <a:buFont typeface="Arial" panose="020B0604020202020204" pitchFamily="34" charset="0"/>
         <a:buChar char="•"/>
-        <a:defRPr sz="1800" kern="1200">
+        <a:defRPr sz="1350" kern="1200">
           <a:solidFill>
             <a:schemeClr val="tx1"/>
           </a:solidFill>
@@ -2167,16 +2606,16 @@
           <a:cs typeface="+mn-cs"/>
         </a:defRPr>
       </a:lvl6pPr>
-      <a:lvl7pPr marL="2971800" indent="-228600" algn="l" defTabSz="914400" rtl="0" eaLnBrk="1" latinLnBrk="0" hangingPunct="1">
+      <a:lvl7pPr marL="2228850" indent="-171450" algn="l" defTabSz="685800" rtl="0" eaLnBrk="1" latinLnBrk="0" hangingPunct="1">
         <a:lnSpc>
           <a:spcPct val="90000"/>
         </a:lnSpc>
         <a:spcBef>
-          <a:spcPts val="500"/>
+          <a:spcPts val="375"/>
         </a:spcBef>
         <a:buFont typeface="Arial" panose="020B0604020202020204" pitchFamily="34" charset="0"/>
         <a:buChar char="•"/>
-        <a:defRPr sz="1800" kern="1200">
+        <a:defRPr sz="1350" kern="1200">
           <a:solidFill>
             <a:schemeClr val="tx1"/>
           </a:solidFill>
@@ -2185,16 +2624,16 @@
           <a:cs typeface="+mn-cs"/>
         </a:defRPr>
       </a:lvl7pPr>
-      <a:lvl8pPr marL="3429000" indent="-228600" algn="l" defTabSz="914400" rtl="0" eaLnBrk="1" latinLnBrk="0" hangingPunct="1">
+      <a:lvl8pPr marL="2571750" indent="-171450" algn="l" defTabSz="685800" rtl="0" eaLnBrk="1" latinLnBrk="0" hangingPunct="1">
         <a:lnSpc>
           <a:spcPct val="90000"/>
         </a:lnSpc>
         <a:spcBef>
-          <a:spcPts val="500"/>
+          <a:spcPts val="375"/>
         </a:spcBef>
         <a:buFont typeface="Arial" panose="020B0604020202020204" pitchFamily="34" charset="0"/>
         <a:buChar char="•"/>
-        <a:defRPr sz="1800" kern="1200">
+        <a:defRPr sz="1350" kern="1200">
           <a:solidFill>
             <a:schemeClr val="tx1"/>
           </a:solidFill>
@@ -2203,16 +2642,16 @@
           <a:cs typeface="+mn-cs"/>
         </a:defRPr>
       </a:lvl8pPr>
-      <a:lvl9pPr marL="3886200" indent="-228600" algn="l" defTabSz="914400" rtl="0" eaLnBrk="1" latinLnBrk="0" hangingPunct="1">
+      <a:lvl9pPr marL="2914650" indent="-171450" algn="l" defTabSz="685800" rtl="0" eaLnBrk="1" latinLnBrk="0" hangingPunct="1">
         <a:lnSpc>
           <a:spcPct val="90000"/>
         </a:lnSpc>
         <a:spcBef>
-          <a:spcPts val="500"/>
+          <a:spcPts val="375"/>
         </a:spcBef>
         <a:buFont typeface="Arial" panose="020B0604020202020204" pitchFamily="34" charset="0"/>
         <a:buChar char="•"/>
-        <a:defRPr sz="1800" kern="1200">
+        <a:defRPr sz="1350" kern="1200">
           <a:solidFill>
             <a:schemeClr val="tx1"/>
           </a:solidFill>
@@ -2226,8 +2665,8 @@
       <a:defPPr>
         <a:defRPr lang="en-US"/>
       </a:defPPr>
-      <a:lvl1pPr marL="0" algn="l" defTabSz="914400" rtl="0" eaLnBrk="1" latinLnBrk="0" hangingPunct="1">
-        <a:defRPr sz="1800" kern="1200">
+      <a:lvl1pPr marL="0" algn="l" defTabSz="685800" rtl="0" eaLnBrk="1" latinLnBrk="0" hangingPunct="1">
+        <a:defRPr sz="1350" kern="1200">
           <a:solidFill>
             <a:schemeClr val="tx1"/>
           </a:solidFill>
@@ -2236,8 +2675,8 @@
           <a:cs typeface="+mn-cs"/>
         </a:defRPr>
       </a:lvl1pPr>
-      <a:lvl2pPr marL="457200" algn="l" defTabSz="914400" rtl="0" eaLnBrk="1" latinLnBrk="0" hangingPunct="1">
-        <a:defRPr sz="1800" kern="1200">
+      <a:lvl2pPr marL="342900" algn="l" defTabSz="685800" rtl="0" eaLnBrk="1" latinLnBrk="0" hangingPunct="1">
+        <a:defRPr sz="1350" kern="1200">
           <a:solidFill>
             <a:schemeClr val="tx1"/>
           </a:solidFill>
@@ -2246,8 +2685,8 @@
           <a:cs typeface="+mn-cs"/>
         </a:defRPr>
       </a:lvl2pPr>
-      <a:lvl3pPr marL="914400" algn="l" defTabSz="914400" rtl="0" eaLnBrk="1" latinLnBrk="0" hangingPunct="1">
-        <a:defRPr sz="1800" kern="1200">
+      <a:lvl3pPr marL="685800" algn="l" defTabSz="685800" rtl="0" eaLnBrk="1" latinLnBrk="0" hangingPunct="1">
+        <a:defRPr sz="1350" kern="1200">
           <a:solidFill>
             <a:schemeClr val="tx1"/>
           </a:solidFill>
@@ -2256,8 +2695,8 @@
           <a:cs typeface="+mn-cs"/>
         </a:defRPr>
       </a:lvl3pPr>
-      <a:lvl4pPr marL="1371600" algn="l" defTabSz="914400" rtl="0" eaLnBrk="1" latinLnBrk="0" hangingPunct="1">
-        <a:defRPr sz="1800" kern="1200">
+      <a:lvl4pPr marL="1028700" algn="l" defTabSz="685800" rtl="0" eaLnBrk="1" latinLnBrk="0" hangingPunct="1">
+        <a:defRPr sz="1350" kern="1200">
           <a:solidFill>
             <a:schemeClr val="tx1"/>
           </a:solidFill>
@@ -2266,8 +2705,8 @@
           <a:cs typeface="+mn-cs"/>
         </a:defRPr>
       </a:lvl4pPr>
-      <a:lvl5pPr marL="1828800" algn="l" defTabSz="914400" rtl="0" eaLnBrk="1" latinLnBrk="0" hangingPunct="1">
-        <a:defRPr sz="1800" kern="1200">
+      <a:lvl5pPr marL="1371600" algn="l" defTabSz="685800" rtl="0" eaLnBrk="1" latinLnBrk="0" hangingPunct="1">
+        <a:defRPr sz="1350" kern="1200">
           <a:solidFill>
             <a:schemeClr val="tx1"/>
           </a:solidFill>
@@ -2276,8 +2715,8 @@
           <a:cs typeface="+mn-cs"/>
         </a:defRPr>
       </a:lvl5pPr>
-      <a:lvl6pPr marL="2286000" algn="l" defTabSz="914400" rtl="0" eaLnBrk="1" latinLnBrk="0" hangingPunct="1">
-        <a:defRPr sz="1800" kern="1200">
+      <a:lvl6pPr marL="1714500" algn="l" defTabSz="685800" rtl="0" eaLnBrk="1" latinLnBrk="0" hangingPunct="1">
+        <a:defRPr sz="1350" kern="1200">
           <a:solidFill>
             <a:schemeClr val="tx1"/>
           </a:solidFill>
@@ -2286,8 +2725,8 @@
           <a:cs typeface="+mn-cs"/>
         </a:defRPr>
       </a:lvl6pPr>
-      <a:lvl7pPr marL="2743200" algn="l" defTabSz="914400" rtl="0" eaLnBrk="1" latinLnBrk="0" hangingPunct="1">
-        <a:defRPr sz="1800" kern="1200">
+      <a:lvl7pPr marL="2057400" algn="l" defTabSz="685800" rtl="0" eaLnBrk="1" latinLnBrk="0" hangingPunct="1">
+        <a:defRPr sz="1350" kern="1200">
           <a:solidFill>
             <a:schemeClr val="tx1"/>
           </a:solidFill>
@@ -2296,8 +2735,8 @@
           <a:cs typeface="+mn-cs"/>
         </a:defRPr>
       </a:lvl7pPr>
-      <a:lvl8pPr marL="3200400" algn="l" defTabSz="914400" rtl="0" eaLnBrk="1" latinLnBrk="0" hangingPunct="1">
-        <a:defRPr sz="1800" kern="1200">
+      <a:lvl8pPr marL="2400300" algn="l" defTabSz="685800" rtl="0" eaLnBrk="1" latinLnBrk="0" hangingPunct="1">
+        <a:defRPr sz="1350" kern="1200">
           <a:solidFill>
             <a:schemeClr val="tx1"/>
           </a:solidFill>
@@ -2306,8 +2745,8 @@
           <a:cs typeface="+mn-cs"/>
         </a:defRPr>
       </a:lvl8pPr>
-      <a:lvl9pPr marL="3657600" algn="l" defTabSz="914400" rtl="0" eaLnBrk="1" latinLnBrk="0" hangingPunct="1">
-        <a:defRPr sz="1800" kern="1200">
+      <a:lvl9pPr marL="2743200" algn="l" defTabSz="685800" rtl="0" eaLnBrk="1" latinLnBrk="0" hangingPunct="1">
+        <a:defRPr sz="1350" kern="1200">
           <a:solidFill>
             <a:schemeClr val="tx1"/>
           </a:solidFill>
@@ -2580,8 +3019,8 @@
         </p:nvSpPr>
         <p:spPr>
           <a:xfrm>
-            <a:off x="417979" y="1482724"/>
-            <a:ext cx="10590447" cy="4811197"/>
+            <a:off x="313485" y="1112043"/>
+            <a:ext cx="7942835" cy="3608398"/>
           </a:xfrm>
         </p:spPr>
         <p:txBody>
@@ -2594,7 +3033,7 @@
               <a:buNone/>
             </a:pPr>
             <a:r>
-              <a:rPr lang="en-US" sz="2800" i="1" dirty="0">
+              <a:rPr lang="en-US" sz="2100" i="1" dirty="0">
                 <a:latin typeface="Roboto Light" panose="02000000000000000000" pitchFamily="2" charset="0"/>
                 <a:ea typeface="Roboto Light" panose="02000000000000000000" pitchFamily="2" charset="0"/>
               </a:rPr>
@@ -2611,11 +3050,11 @@
           <a:p>
             <a:pPr lvl="1">
               <a:spcBef>
-                <a:spcPts val="1700"/>
+                <a:spcPts val="1275"/>
               </a:spcBef>
             </a:pPr>
             <a:r>
-              <a:rPr lang="en-US" sz="2400" i="1" dirty="0">
+              <a:rPr lang="en-US" sz="1800" i="1" dirty="0">
                 <a:latin typeface="Roboto Light" panose="02000000000000000000" pitchFamily="2" charset="0"/>
                 <a:ea typeface="Roboto Light" panose="02000000000000000000" pitchFamily="2" charset="0"/>
               </a:rPr>
@@ -2625,11 +3064,11 @@
           <a:p>
             <a:pPr lvl="1">
               <a:spcBef>
-                <a:spcPts val="1700"/>
+                <a:spcPts val="1275"/>
               </a:spcBef>
             </a:pPr>
             <a:r>
-              <a:rPr lang="en-US" sz="2400" i="1" dirty="0">
+              <a:rPr lang="en-US" sz="1800" i="1" dirty="0">
                 <a:latin typeface="Roboto Light" panose="02000000000000000000" pitchFamily="2" charset="0"/>
                 <a:ea typeface="Roboto Light" panose="02000000000000000000" pitchFamily="2" charset="0"/>
               </a:rPr>
@@ -2639,11 +3078,11 @@
           <a:p>
             <a:pPr lvl="1">
               <a:spcBef>
-                <a:spcPts val="1700"/>
+                <a:spcPts val="1275"/>
               </a:spcBef>
             </a:pPr>
             <a:r>
-              <a:rPr lang="en-US" sz="2400" i="1" dirty="0">
+              <a:rPr lang="en-US" sz="1800" i="1" dirty="0">
                 <a:latin typeface="Roboto Light" panose="02000000000000000000" pitchFamily="2" charset="0"/>
                 <a:ea typeface="Roboto Light" panose="02000000000000000000" pitchFamily="2" charset="0"/>
               </a:rPr>
@@ -3222,4 +3661,299 @@
     </a:ext>
   </a:extLst>
 </a:theme>
+</file>
+
+<file path=ppt/theme/theme2.xml><?xml version="1.0" encoding="utf-8"?>
+<a:theme xmlns:a="http://schemas.openxmlformats.org/drawingml/2006/main" name="Office Theme">
+  <a:themeElements>
+    <a:clrScheme name="Office">
+      <a:dk1>
+        <a:sysClr val="windowText" lastClr="000000"/>
+      </a:dk1>
+      <a:lt1>
+        <a:sysClr val="window" lastClr="FFFFFF"/>
+      </a:lt1>
+      <a:dk2>
+        <a:srgbClr val="44546A"/>
+      </a:dk2>
+      <a:lt2>
+        <a:srgbClr val="E7E6E6"/>
+      </a:lt2>
+      <a:accent1>
+        <a:srgbClr val="4472C4"/>
+      </a:accent1>
+      <a:accent2>
+        <a:srgbClr val="ED7D31"/>
+      </a:accent2>
+      <a:accent3>
+        <a:srgbClr val="A5A5A5"/>
+      </a:accent3>
+      <a:accent4>
+        <a:srgbClr val="FFC000"/>
+      </a:accent4>
+      <a:accent5>
+        <a:srgbClr val="5B9BD5"/>
+      </a:accent5>
+      <a:accent6>
+        <a:srgbClr val="70AD47"/>
+      </a:accent6>
+      <a:hlink>
+        <a:srgbClr val="0563C1"/>
+      </a:hlink>
+      <a:folHlink>
+        <a:srgbClr val="954F72"/>
+      </a:folHlink>
+    </a:clrScheme>
+    <a:fontScheme name="Office">
+      <a:majorFont>
+        <a:latin typeface="Calibri Light" panose="020F0302020204030204"/>
+        <a:ea typeface=""/>
+        <a:cs typeface=""/>
+        <a:font script="Jpan" typeface="游ゴシック Light"/>
+        <a:font script="Hang" typeface="맑은 고딕"/>
+        <a:font script="Hans" typeface="等线 Light"/>
+        <a:font script="Hant" typeface="新細明體"/>
+        <a:font script="Arab" typeface="Times New Roman"/>
+        <a:font script="Hebr" typeface="Times New Roman"/>
+        <a:font script="Thai" typeface="Angsana New"/>
+        <a:font script="Ethi" typeface="Nyala"/>
+        <a:font script="Beng" typeface="Vrinda"/>
+        <a:font script="Gujr" typeface="Shruti"/>
+        <a:font script="Khmr" typeface="MoolBoran"/>
+        <a:font script="Knda" typeface="Tunga"/>
+        <a:font script="Guru" typeface="Raavi"/>
+        <a:font script="Cans" typeface="Euphemia"/>
+        <a:font script="Cher" typeface="Plantagenet Cherokee"/>
+        <a:font script="Yiii" typeface="Microsoft Yi Baiti"/>
+        <a:font script="Tibt" typeface="Microsoft Himalaya"/>
+        <a:font script="Thaa" typeface="MV Boli"/>
+        <a:font script="Deva" typeface="Mangal"/>
+        <a:font script="Telu" typeface="Gautami"/>
+        <a:font script="Taml" typeface="Latha"/>
+        <a:font script="Syrc" typeface="Estrangelo Edessa"/>
+        <a:font script="Orya" typeface="Kalinga"/>
+        <a:font script="Mlym" typeface="Kartika"/>
+        <a:font script="Laoo" typeface="DokChampa"/>
+        <a:font script="Sinh" typeface="Iskoola Pota"/>
+        <a:font script="Mong" typeface="Mongolian Baiti"/>
+        <a:font script="Viet" typeface="Times New Roman"/>
+        <a:font script="Uigh" typeface="Microsoft Uighur"/>
+        <a:font script="Geor" typeface="Sylfaen"/>
+        <a:font script="Armn" typeface="Arial"/>
+        <a:font script="Bugi" typeface="Leelawadee UI"/>
+        <a:font script="Bopo" typeface="Microsoft JhengHei"/>
+        <a:font script="Java" typeface="Javanese Text"/>
+        <a:font script="Lisu" typeface="Segoe UI"/>
+        <a:font script="Mymr" typeface="Myanmar Text"/>
+        <a:font script="Nkoo" typeface="Ebrima"/>
+        <a:font script="Olck" typeface="Nirmala UI"/>
+        <a:font script="Osma" typeface="Ebrima"/>
+        <a:font script="Phag" typeface="Phagspa"/>
+        <a:font script="Syrn" typeface="Estrangelo Edessa"/>
+        <a:font script="Syrj" typeface="Estrangelo Edessa"/>
+        <a:font script="Syre" typeface="Estrangelo Edessa"/>
+        <a:font script="Sora" typeface="Nirmala UI"/>
+        <a:font script="Tale" typeface="Microsoft Tai Le"/>
+        <a:font script="Talu" typeface="Microsoft New Tai Lue"/>
+        <a:font script="Tfng" typeface="Ebrima"/>
+      </a:majorFont>
+      <a:minorFont>
+        <a:latin typeface="Calibri" panose="020F0502020204030204"/>
+        <a:ea typeface=""/>
+        <a:cs typeface=""/>
+        <a:font script="Jpan" typeface="游ゴシック"/>
+        <a:font script="Hang" typeface="맑은 고딕"/>
+        <a:font script="Hans" typeface="等线"/>
+        <a:font script="Hant" typeface="新細明體"/>
+        <a:font script="Arab" typeface="Arial"/>
+        <a:font script="Hebr" typeface="Arial"/>
+        <a:font script="Thai" typeface="Cordia New"/>
+        <a:font script="Ethi" typeface="Nyala"/>
+        <a:font script="Beng" typeface="Vrinda"/>
+        <a:font script="Gujr" typeface="Shruti"/>
+        <a:font script="Khmr" typeface="DaunPenh"/>
+        <a:font script="Knda" typeface="Tunga"/>
+        <a:font script="Guru" typeface="Raavi"/>
+        <a:font script="Cans" typeface="Euphemia"/>
+        <a:font script="Cher" typeface="Plantagenet Cherokee"/>
+        <a:font script="Yiii" typeface="Microsoft Yi Baiti"/>
+        <a:font script="Tibt" typeface="Microsoft Himalaya"/>
+        <a:font script="Thaa" typeface="MV Boli"/>
+        <a:font script="Deva" typeface="Mangal"/>
+        <a:font script="Telu" typeface="Gautami"/>
+        <a:font script="Taml" typeface="Latha"/>
+        <a:font script="Syrc" typeface="Estrangelo Edessa"/>
+        <a:font script="Orya" typeface="Kalinga"/>
+        <a:font script="Mlym" typeface="Kartika"/>
+        <a:font script="Laoo" typeface="DokChampa"/>
+        <a:font script="Sinh" typeface="Iskoola Pota"/>
+        <a:font script="Mong" typeface="Mongolian Baiti"/>
+        <a:font script="Viet" typeface="Arial"/>
+        <a:font script="Uigh" typeface="Microsoft Uighur"/>
+        <a:font script="Geor" typeface="Sylfaen"/>
+        <a:font script="Armn" typeface="Arial"/>
+        <a:font script="Bugi" typeface="Leelawadee UI"/>
+        <a:font script="Bopo" typeface="Microsoft JhengHei"/>
+        <a:font script="Java" typeface="Javanese Text"/>
+        <a:font script="Lisu" typeface="Segoe UI"/>
+        <a:font script="Mymr" typeface="Myanmar Text"/>
+        <a:font script="Nkoo" typeface="Ebrima"/>
+        <a:font script="Olck" typeface="Nirmala UI"/>
+        <a:font script="Osma" typeface="Ebrima"/>
+        <a:font script="Phag" typeface="Phagspa"/>
+        <a:font script="Syrn" typeface="Estrangelo Edessa"/>
+        <a:font script="Syrj" typeface="Estrangelo Edessa"/>
+        <a:font script="Syre" typeface="Estrangelo Edessa"/>
+        <a:font script="Sora" typeface="Nirmala UI"/>
+        <a:font script="Tale" typeface="Microsoft Tai Le"/>
+        <a:font script="Talu" typeface="Microsoft New Tai Lue"/>
+        <a:font script="Tfng" typeface="Ebrima"/>
+      </a:minorFont>
+    </a:fontScheme>
+    <a:fmtScheme name="Office">
+      <a:fillStyleLst>
+        <a:solidFill>
+          <a:schemeClr val="phClr"/>
+        </a:solidFill>
+        <a:gradFill rotWithShape="1">
+          <a:gsLst>
+            <a:gs pos="0">
+              <a:schemeClr val="phClr">
+                <a:lumMod val="110000"/>
+                <a:satMod val="105000"/>
+                <a:tint val="67000"/>
+              </a:schemeClr>
+            </a:gs>
+            <a:gs pos="50000">
+              <a:schemeClr val="phClr">
+                <a:lumMod val="105000"/>
+                <a:satMod val="103000"/>
+                <a:tint val="73000"/>
+              </a:schemeClr>
+            </a:gs>
+            <a:gs pos="100000">
+              <a:schemeClr val="phClr">
+                <a:lumMod val="105000"/>
+                <a:satMod val="109000"/>
+                <a:tint val="81000"/>
+              </a:schemeClr>
+            </a:gs>
+          </a:gsLst>
+          <a:lin ang="5400000" scaled="0"/>
+        </a:gradFill>
+        <a:gradFill rotWithShape="1">
+          <a:gsLst>
+            <a:gs pos="0">
+              <a:schemeClr val="phClr">
+                <a:satMod val="103000"/>
+                <a:lumMod val="102000"/>
+                <a:tint val="94000"/>
+              </a:schemeClr>
+            </a:gs>
+            <a:gs pos="50000">
+              <a:schemeClr val="phClr">
+                <a:satMod val="110000"/>
+                <a:lumMod val="100000"/>
+                <a:shade val="100000"/>
+              </a:schemeClr>
+            </a:gs>
+            <a:gs pos="100000">
+              <a:schemeClr val="phClr">
+                <a:lumMod val="99000"/>
+                <a:satMod val="120000"/>
+                <a:shade val="78000"/>
+              </a:schemeClr>
+            </a:gs>
+          </a:gsLst>
+          <a:lin ang="5400000" scaled="0"/>
+        </a:gradFill>
+      </a:fillStyleLst>
+      <a:lnStyleLst>
+        <a:ln w="6350" cap="flat" cmpd="sng" algn="ctr">
+          <a:solidFill>
+            <a:schemeClr val="phClr"/>
+          </a:solidFill>
+          <a:prstDash val="solid"/>
+          <a:miter lim="800000"/>
+        </a:ln>
+        <a:ln w="12700" cap="flat" cmpd="sng" algn="ctr">
+          <a:solidFill>
+            <a:schemeClr val="phClr"/>
+          </a:solidFill>
+          <a:prstDash val="solid"/>
+          <a:miter lim="800000"/>
+        </a:ln>
+        <a:ln w="19050" cap="flat" cmpd="sng" algn="ctr">
+          <a:solidFill>
+            <a:schemeClr val="phClr"/>
+          </a:solidFill>
+          <a:prstDash val="solid"/>
+          <a:miter lim="800000"/>
+        </a:ln>
+      </a:lnStyleLst>
+      <a:effectStyleLst>
+        <a:effectStyle>
+          <a:effectLst/>
+        </a:effectStyle>
+        <a:effectStyle>
+          <a:effectLst/>
+        </a:effectStyle>
+        <a:effectStyle>
+          <a:effectLst>
+            <a:outerShdw blurRad="57150" dist="19050" dir="5400000" algn="ctr" rotWithShape="0">
+              <a:srgbClr val="000000">
+                <a:alpha val="63000"/>
+              </a:srgbClr>
+            </a:outerShdw>
+          </a:effectLst>
+        </a:effectStyle>
+      </a:effectStyleLst>
+      <a:bgFillStyleLst>
+        <a:solidFill>
+          <a:schemeClr val="phClr"/>
+        </a:solidFill>
+        <a:solidFill>
+          <a:schemeClr val="phClr">
+            <a:tint val="95000"/>
+            <a:satMod val="170000"/>
+          </a:schemeClr>
+        </a:solidFill>
+        <a:gradFill rotWithShape="1">
+          <a:gsLst>
+            <a:gs pos="0">
+              <a:schemeClr val="phClr">
+                <a:tint val="93000"/>
+                <a:satMod val="150000"/>
+                <a:shade val="98000"/>
+                <a:lumMod val="102000"/>
+              </a:schemeClr>
+            </a:gs>
+            <a:gs pos="50000">
+              <a:schemeClr val="phClr">
+                <a:tint val="98000"/>
+                <a:satMod val="130000"/>
+                <a:shade val="90000"/>
+                <a:lumMod val="103000"/>
+              </a:schemeClr>
+            </a:gs>
+            <a:gs pos="100000">
+              <a:schemeClr val="phClr">
+                <a:shade val="63000"/>
+                <a:satMod val="120000"/>
+              </a:schemeClr>
+            </a:gs>
+          </a:gsLst>
+          <a:lin ang="5400000" scaled="0"/>
+        </a:gradFill>
+      </a:bgFillStyleLst>
+    </a:fmtScheme>
+  </a:themeElements>
+  <a:objectDefaults/>
+  <a:extraClrSchemeLst/>
+  <a:extLst>
+    <a:ext uri="{05A4C25C-085E-4340-85A3-A5531E510DB2}">
+      <thm15:themeFamily xmlns:thm15="http://schemas.microsoft.com/office/thememl/2012/main" name="Office Theme" id="{62F939B6-93AF-4DB8-9C6B-D6C7DFDC589F}" vid="{4A3C46E8-61CC-4603-A589-7422A47A8E4A}"/>
+    </a:ext>
+  </a:extLst>
+</a:theme>
 </file>
</xml_diff>